<commit_message>
Functions presentation part 2
</commit_message>
<xml_diff>
--- a/Functions/Functions part 1.pptx
+++ b/Functions/Functions part 1.pptx
@@ -246,7 +246,7 @@
           <a:p>
             <a:fld id="{1AC4E562-BB57-45BF-B219-CF5327416608}" type="datetimeFigureOut">
               <a:rPr lang="uk-UA" smtClean="0"/>
-              <a:t>16.02.2020</a:t>
+              <a:t>19.02.2020</a:t>
             </a:fld>
             <a:endParaRPr lang="uk-UA"/>
           </a:p>
@@ -557,10 +557,6 @@
           <a:bodyPr/>
           <a:lstStyle/>
           <a:p>
-            <a:r>
-              <a:rPr lang="en-US" dirty="0"/>
-              <a:t>Many parameters</a:t>
-            </a:r>
             <a:endParaRPr lang="uk-UA" dirty="0"/>
           </a:p>
         </p:txBody>
@@ -582,7 +578,7 @@
           <a:p>
             <a:fld id="{DA191184-6DA6-4EC5-8D1D-2AEFC2BF110D}" type="slidenum">
               <a:rPr lang="uk-UA" smtClean="0"/>
-              <a:t>13</a:t>
+              <a:t>1</a:t>
             </a:fld>
             <a:endParaRPr lang="uk-UA"/>
           </a:p>
@@ -591,7 +587,7 @@
     </p:spTree>
     <p:extLst>
       <p:ext uri="{BB962C8B-B14F-4D97-AF65-F5344CB8AC3E}">
-        <p14:creationId xmlns:p14="http://schemas.microsoft.com/office/powerpoint/2010/main" val="3159746984"/>
+        <p14:creationId xmlns:p14="http://schemas.microsoft.com/office/powerpoint/2010/main" val="833731190"/>
       </p:ext>
     </p:extLst>
   </p:cSld>
@@ -647,6 +643,94 @@
           <a:p>
             <a:r>
               <a:rPr lang="en-US" dirty="0"/>
+              <a:t>Many parameters</a:t>
+            </a:r>
+            <a:endParaRPr lang="uk-UA" dirty="0"/>
+          </a:p>
+        </p:txBody>
+      </p:sp>
+      <p:sp>
+        <p:nvSpPr>
+          <p:cNvPr id="4" name="Місце для номера слайда 3"/>
+          <p:cNvSpPr>
+            <a:spLocks noGrp="1"/>
+          </p:cNvSpPr>
+          <p:nvPr>
+            <p:ph type="sldNum" sz="quarter" idx="5"/>
+          </p:nvPr>
+        </p:nvSpPr>
+        <p:spPr/>
+        <p:txBody>
+          <a:bodyPr/>
+          <a:lstStyle/>
+          <a:p>
+            <a:fld id="{DA191184-6DA6-4EC5-8D1D-2AEFC2BF110D}" type="slidenum">
+              <a:rPr lang="uk-UA" smtClean="0"/>
+              <a:t>13</a:t>
+            </a:fld>
+            <a:endParaRPr lang="uk-UA"/>
+          </a:p>
+        </p:txBody>
+      </p:sp>
+    </p:spTree>
+    <p:extLst>
+      <p:ext uri="{BB962C8B-B14F-4D97-AF65-F5344CB8AC3E}">
+        <p14:creationId xmlns:p14="http://schemas.microsoft.com/office/powerpoint/2010/main" val="3159746984"/>
+      </p:ext>
+    </p:extLst>
+  </p:cSld>
+  <p:clrMapOvr>
+    <a:masterClrMapping/>
+  </p:clrMapOvr>
+</p:notes>
+</file>
+
+<file path=ppt/notesSlides/notesSlide3.xml><?xml version="1.0" encoding="utf-8"?>
+<p:notes xmlns:a="http://schemas.openxmlformats.org/drawingml/2006/main" xmlns:r="http://schemas.openxmlformats.org/officeDocument/2006/relationships" xmlns:p="http://schemas.openxmlformats.org/presentationml/2006/main">
+  <p:cSld>
+    <p:spTree>
+      <p:nvGrpSpPr>
+        <p:cNvPr id="1" name=""/>
+        <p:cNvGrpSpPr/>
+        <p:nvPr/>
+      </p:nvGrpSpPr>
+      <p:grpSpPr>
+        <a:xfrm>
+          <a:off x="0" y="0"/>
+          <a:ext cx="0" cy="0"/>
+          <a:chOff x="0" y="0"/>
+          <a:chExt cx="0" cy="0"/>
+        </a:xfrm>
+      </p:grpSpPr>
+      <p:sp>
+        <p:nvSpPr>
+          <p:cNvPr id="2" name="Місце для зображення 1"/>
+          <p:cNvSpPr>
+            <a:spLocks noGrp="1" noRot="1" noChangeAspect="1"/>
+          </p:cNvSpPr>
+          <p:nvPr>
+            <p:ph type="sldImg"/>
+          </p:nvPr>
+        </p:nvSpPr>
+        <p:spPr/>
+      </p:sp>
+      <p:sp>
+        <p:nvSpPr>
+          <p:cNvPr id="3" name="Місце для нотаток 2"/>
+          <p:cNvSpPr>
+            <a:spLocks noGrp="1"/>
+          </p:cNvSpPr>
+          <p:nvPr>
+            <p:ph type="body" idx="1"/>
+          </p:nvPr>
+        </p:nvSpPr>
+        <p:spPr/>
+        <p:txBody>
+          <a:bodyPr/>
+          <a:lstStyle/>
+          <a:p>
+            <a:r>
+              <a:rPr lang="en-US" dirty="0"/>
               <a:t>RAM</a:t>
             </a:r>
             <a:endParaRPr lang="uk-UA" dirty="0"/>
@@ -689,7 +773,7 @@
 </p:notes>
 </file>
 
-<file path=ppt/notesSlides/notesSlide3.xml><?xml version="1.0" encoding="utf-8"?>
+<file path=ppt/notesSlides/notesSlide4.xml><?xml version="1.0" encoding="utf-8"?>
 <p:notes xmlns:a="http://schemas.openxmlformats.org/drawingml/2006/main" xmlns:r="http://schemas.openxmlformats.org/officeDocument/2006/relationships" xmlns:p="http://schemas.openxmlformats.org/presentationml/2006/main">
   <p:cSld>
     <p:spTree>
@@ -12332,15 +12416,7 @@
             </a:r>
             <a:r>
               <a:rPr lang="en-US" dirty="0"/>
-              <a:t> return a value. In JavaScript, if no return value is </a:t>
-            </a:r>
-            <a:r>
-              <a:rPr lang="en-US" dirty="0" err="1"/>
-              <a:t>spectified</a:t>
-            </a:r>
-            <a:r>
-              <a:rPr lang="en-US" dirty="0"/>
-              <a:t>, the function will return undefined.</a:t>
+              <a:t> return a value. In JavaScript, if no return value is specified, the function will return undefined.</a:t>
             </a:r>
             <a:endParaRPr lang="uk-UA" dirty="0"/>
           </a:p>
@@ -14181,20 +14257,20 @@
 </file>
 
 <file path=customXml/item1.xml><?xml version="1.0" encoding="utf-8"?>
-<p:properties xmlns:p="http://schemas.microsoft.com/office/2006/metadata/properties" xmlns:xsi="http://www.w3.org/2001/XMLSchema-instance" xmlns:pc="http://schemas.microsoft.com/office/infopath/2007/PartnerControls">
-  <documentManagement>
-    <_x041a__x043e__x043c__x0435__x0442__x0430__x0440_ xmlns="835f28f2-30f1-4728-84d2-86d96e143488" xsi:nil="true"/>
-  </documentManagement>
-</p:properties>
-</file>
-
-<file path=customXml/item2.xml><?xml version="1.0" encoding="utf-8"?>
 <?mso-contentType ?>
 <FormTemplates xmlns="http://schemas.microsoft.com/sharepoint/v3/contenttype/forms">
   <Display>DocumentLibraryForm</Display>
   <Edit>DocumentLibraryForm</Edit>
   <New>DocumentLibraryForm</New>
 </FormTemplates>
+</file>
+
+<file path=customXml/item2.xml><?xml version="1.0" encoding="utf-8"?>
+<p:properties xmlns:p="http://schemas.microsoft.com/office/2006/metadata/properties" xmlns:xsi="http://www.w3.org/2001/XMLSchema-instance" xmlns:pc="http://schemas.microsoft.com/office/infopath/2007/PartnerControls">
+  <documentManagement>
+    <_x041a__x043e__x043c__x0435__x0442__x0430__x0440_ xmlns="835f28f2-30f1-4728-84d2-86d96e143488" xsi:nil="true"/>
+  </documentManagement>
+</p:properties>
 </file>
 
 <file path=customXml/item3.xml><?xml version="1.0" encoding="utf-8"?>
@@ -14397,6 +14473,14 @@
 </file>
 
 <file path=customXml/itemProps1.xml><?xml version="1.0" encoding="utf-8"?>
+<ds:datastoreItem xmlns:ds="http://schemas.openxmlformats.org/officeDocument/2006/customXml" ds:itemID="{296B3B9E-03D8-4766-BF45-6129617CF026}">
+  <ds:schemaRefs>
+    <ds:schemaRef ds:uri="http://schemas.microsoft.com/sharepoint/v3/contenttype/forms"/>
+  </ds:schemaRefs>
+</ds:datastoreItem>
+</file>
+
+<file path=customXml/itemProps2.xml><?xml version="1.0" encoding="utf-8"?>
 <ds:datastoreItem xmlns:ds="http://schemas.openxmlformats.org/officeDocument/2006/customXml" ds:itemID="{B3A1340B-3A1B-4156-ADE3-51DF6C2C795D}">
   <ds:schemaRefs>
     <ds:schemaRef ds:uri="http://schemas.microsoft.com/office/2006/documentManagement/types"/>
@@ -14409,14 +14493,6 @@
     <ds:schemaRef ds:uri="http://schemas.openxmlformats.org/package/2006/metadata/core-properties"/>
     <ds:schemaRef ds:uri="http://schemas.microsoft.com/office/2006/metadata/properties"/>
     <ds:schemaRef ds:uri="http://www.w3.org/XML/1998/namespace"/>
-  </ds:schemaRefs>
-</ds:datastoreItem>
-</file>
-
-<file path=customXml/itemProps2.xml><?xml version="1.0" encoding="utf-8"?>
-<ds:datastoreItem xmlns:ds="http://schemas.openxmlformats.org/officeDocument/2006/customXml" ds:itemID="{296B3B9E-03D8-4766-BF45-6129617CF026}">
-  <ds:schemaRefs>
-    <ds:schemaRef ds:uri="http://schemas.microsoft.com/sharepoint/v3/contenttype/forms"/>
   </ds:schemaRefs>
 </ds:datastoreItem>
 </file>

</xml_diff>